<commit_message>
some progress on ex.
</commit_message>
<xml_diff>
--- a/rua.pptx
+++ b/rua.pptx
@@ -3335,7 +3335,7 @@
         </p:nvSpPr>
         <p:spPr>
           <a:xfrm>
-            <a:off x="654338" y="1283855"/>
+            <a:off x="274987" y="1722582"/>
             <a:ext cx="1307870" cy="775854"/>
           </a:xfrm>
           <a:prstGeom prst="roundRect">
@@ -3387,7 +3387,7 @@
         </p:nvSpPr>
         <p:spPr>
           <a:xfrm>
-            <a:off x="9309551" y="1462232"/>
+            <a:off x="7509326" y="1722582"/>
             <a:ext cx="1307870" cy="775854"/>
           </a:xfrm>
           <a:prstGeom prst="roundRect">
@@ -3534,7 +3534,7 @@
         </p:nvSpPr>
         <p:spPr>
           <a:xfrm>
-            <a:off x="2359371" y="5974874"/>
+            <a:off x="2515926" y="6082146"/>
             <a:ext cx="1307870" cy="775854"/>
           </a:xfrm>
           <a:prstGeom prst="roundRect">
@@ -3586,7 +3586,7 @@
         </p:nvSpPr>
         <p:spPr>
           <a:xfrm>
-            <a:off x="5051598" y="5747463"/>
+            <a:off x="5032112" y="6082146"/>
             <a:ext cx="1307870" cy="775854"/>
           </a:xfrm>
           <a:prstGeom prst="roundRect">
@@ -3638,7 +3638,7 @@
         </p:nvSpPr>
         <p:spPr>
           <a:xfrm>
-            <a:off x="10617421" y="5974874"/>
+            <a:off x="10884130" y="6082146"/>
             <a:ext cx="1307870" cy="775854"/>
           </a:xfrm>
           <a:prstGeom prst="roundRect">
@@ -3690,7 +3690,7 @@
         </p:nvSpPr>
         <p:spPr>
           <a:xfrm>
-            <a:off x="3111788" y="1315894"/>
+            <a:off x="2515926" y="1722582"/>
             <a:ext cx="1307870" cy="775854"/>
           </a:xfrm>
           <a:prstGeom prst="roundRect">
@@ -3730,10 +3730,10 @@
       </p:sp>
       <p:sp>
         <p:nvSpPr>
-          <p:cNvPr id="35" name="矩形: 圆角 34">
-            <a:extLst>
-              <a:ext uri="{FF2B5EF4-FFF2-40B4-BE49-F238E27FC236}">
-                <a16:creationId xmlns:a16="http://schemas.microsoft.com/office/drawing/2014/main" id="{6E14C37A-1A8D-48DE-9056-F9B2EA1269F2}"/>
+          <p:cNvPr id="36" name="矩形: 圆角 35">
+            <a:extLst>
+              <a:ext uri="{FF2B5EF4-FFF2-40B4-BE49-F238E27FC236}">
+                <a16:creationId xmlns:a16="http://schemas.microsoft.com/office/drawing/2014/main" id="{DB9B646C-F282-4276-9E17-A3858DA8A2F4}"/>
               </a:ext>
             </a:extLst>
           </p:cNvPr>
@@ -3742,7 +3742,7 @@
         </p:nvSpPr>
         <p:spPr>
           <a:xfrm>
-            <a:off x="6937826" y="1334655"/>
+            <a:off x="5051598" y="3524233"/>
             <a:ext cx="1307870" cy="775854"/>
           </a:xfrm>
           <a:prstGeom prst="roundRect">
@@ -3775,17 +3775,59 @@
                 <a:latin typeface="微软雅黑" panose="020B0503020204020204" pitchFamily="34" charset="-122"/>
                 <a:ea typeface="微软雅黑" panose="020B0503020204020204" pitchFamily="34" charset="-122"/>
               </a:rPr>
-              <a:t>ALU</a:t>
-            </a:r>
-          </a:p>
-        </p:txBody>
-      </p:sp>
-      <p:sp>
-        <p:nvSpPr>
-          <p:cNvPr id="36" name="矩形: 圆角 35">
-            <a:extLst>
-              <a:ext uri="{FF2B5EF4-FFF2-40B4-BE49-F238E27FC236}">
-                <a16:creationId xmlns:a16="http://schemas.microsoft.com/office/drawing/2014/main" id="{DB9B646C-F282-4276-9E17-A3858DA8A2F4}"/>
+              <a:t>REG</a:t>
+            </a:r>
+          </a:p>
+        </p:txBody>
+      </p:sp>
+      <p:cxnSp>
+        <p:nvCxnSpPr>
+          <p:cNvPr id="40" name="直接箭头连接符 39">
+            <a:extLst>
+              <a:ext uri="{FF2B5EF4-FFF2-40B4-BE49-F238E27FC236}">
+                <a16:creationId xmlns:a16="http://schemas.microsoft.com/office/drawing/2014/main" id="{49AD9B03-BFCF-48EC-B800-BA5F494AFE1D}"/>
+              </a:ext>
+            </a:extLst>
+          </p:cNvPr>
+          <p:cNvCxnSpPr>
+            <a:stCxn id="25" idx="0"/>
+            <a:endCxn id="28" idx="2"/>
+          </p:cNvCxnSpPr>
+          <p:nvPr/>
+        </p:nvCxnSpPr>
+        <p:spPr>
+          <a:xfrm flipV="1">
+            <a:off x="3169861" y="2498436"/>
+            <a:ext cx="0" cy="3583710"/>
+          </a:xfrm>
+          <a:prstGeom prst="straightConnector1">
+            <a:avLst/>
+          </a:prstGeom>
+          <a:ln>
+            <a:tailEnd type="triangle"/>
+          </a:ln>
+        </p:spPr>
+        <p:style>
+          <a:lnRef idx="1">
+            <a:schemeClr val="accent1"/>
+          </a:lnRef>
+          <a:fillRef idx="0">
+            <a:schemeClr val="accent1"/>
+          </a:fillRef>
+          <a:effectRef idx="0">
+            <a:schemeClr val="accent1"/>
+          </a:effectRef>
+          <a:fontRef idx="minor">
+            <a:schemeClr val="tx1"/>
+          </a:fontRef>
+        </p:style>
+      </p:cxnSp>
+      <p:sp>
+        <p:nvSpPr>
+          <p:cNvPr id="43" name="矩形: 圆角 42">
+            <a:extLst>
+              <a:ext uri="{FF2B5EF4-FFF2-40B4-BE49-F238E27FC236}">
+                <a16:creationId xmlns:a16="http://schemas.microsoft.com/office/drawing/2014/main" id="{DBC29D06-7E70-4423-B095-97B4EFB2764E}"/>
               </a:ext>
             </a:extLst>
           </p:cNvPr>
@@ -3794,7 +3836,7 @@
         </p:nvSpPr>
         <p:spPr>
           <a:xfrm>
-            <a:off x="4697839" y="2711349"/>
+            <a:off x="5012626" y="1722582"/>
             <a:ext cx="1307870" cy="775854"/>
           </a:xfrm>
           <a:prstGeom prst="roundRect">
@@ -3827,30 +3869,198 @@
                 <a:latin typeface="微软雅黑" panose="020B0503020204020204" pitchFamily="34" charset="-122"/>
                 <a:ea typeface="微软雅黑" panose="020B0503020204020204" pitchFamily="34" charset="-122"/>
               </a:rPr>
-              <a:t>REG</a:t>
+              <a:t>ID</a:t>
             </a:r>
           </a:p>
         </p:txBody>
       </p:sp>
       <p:cxnSp>
         <p:nvCxnSpPr>
-          <p:cNvPr id="40" name="直接箭头连接符 39">
-            <a:extLst>
-              <a:ext uri="{FF2B5EF4-FFF2-40B4-BE49-F238E27FC236}">
-                <a16:creationId xmlns:a16="http://schemas.microsoft.com/office/drawing/2014/main" id="{49AD9B03-BFCF-48EC-B800-BA5F494AFE1D}"/>
+          <p:cNvPr id="47" name="直接箭头连接符 46">
+            <a:extLst>
+              <a:ext uri="{FF2B5EF4-FFF2-40B4-BE49-F238E27FC236}">
+                <a16:creationId xmlns:a16="http://schemas.microsoft.com/office/drawing/2014/main" id="{BFAFA570-8A62-4498-8314-9A0E29188EC2}"/>
               </a:ext>
             </a:extLst>
           </p:cNvPr>
           <p:cNvCxnSpPr>
-            <a:stCxn id="25" idx="0"/>
-            <a:endCxn id="28" idx="2"/>
+            <a:stCxn id="7" idx="3"/>
+            <a:endCxn id="28" idx="1"/>
+          </p:cNvCxnSpPr>
+          <p:nvPr/>
+        </p:nvCxnSpPr>
+        <p:spPr>
+          <a:xfrm>
+            <a:off x="1582857" y="2110509"/>
+            <a:ext cx="933069" cy="0"/>
+          </a:xfrm>
+          <a:prstGeom prst="straightConnector1">
+            <a:avLst/>
+          </a:prstGeom>
+          <a:ln>
+            <a:tailEnd type="triangle"/>
+          </a:ln>
+        </p:spPr>
+        <p:style>
+          <a:lnRef idx="1">
+            <a:schemeClr val="accent1"/>
+          </a:lnRef>
+          <a:fillRef idx="0">
+            <a:schemeClr val="accent1"/>
+          </a:fillRef>
+          <a:effectRef idx="0">
+            <a:schemeClr val="accent1"/>
+          </a:effectRef>
+          <a:fontRef idx="minor">
+            <a:schemeClr val="tx1"/>
+          </a:fontRef>
+        </p:style>
+      </p:cxnSp>
+      <p:cxnSp>
+        <p:nvCxnSpPr>
+          <p:cNvPr id="49" name="直接箭头连接符 48">
+            <a:extLst>
+              <a:ext uri="{FF2B5EF4-FFF2-40B4-BE49-F238E27FC236}">
+                <a16:creationId xmlns:a16="http://schemas.microsoft.com/office/drawing/2014/main" id="{D59C02AF-4FC8-477A-A486-671BAC4E5049}"/>
+              </a:ext>
+            </a:extLst>
+          </p:cNvPr>
+          <p:cNvCxnSpPr>
+            <a:stCxn id="28" idx="3"/>
+            <a:endCxn id="43" idx="1"/>
+          </p:cNvCxnSpPr>
+          <p:nvPr/>
+        </p:nvCxnSpPr>
+        <p:spPr>
+          <a:xfrm>
+            <a:off x="3823796" y="2110509"/>
+            <a:ext cx="1188830" cy="0"/>
+          </a:xfrm>
+          <a:prstGeom prst="straightConnector1">
+            <a:avLst/>
+          </a:prstGeom>
+          <a:ln>
+            <a:tailEnd type="triangle"/>
+          </a:ln>
+        </p:spPr>
+        <p:style>
+          <a:lnRef idx="1">
+            <a:schemeClr val="accent1"/>
+          </a:lnRef>
+          <a:fillRef idx="0">
+            <a:schemeClr val="accent1"/>
+          </a:fillRef>
+          <a:effectRef idx="0">
+            <a:schemeClr val="accent1"/>
+          </a:effectRef>
+          <a:fontRef idx="minor">
+            <a:schemeClr val="tx1"/>
+          </a:fontRef>
+        </p:style>
+      </p:cxnSp>
+      <p:cxnSp>
+        <p:nvCxnSpPr>
+          <p:cNvPr id="51" name="直接箭头连接符 50">
+            <a:extLst>
+              <a:ext uri="{FF2B5EF4-FFF2-40B4-BE49-F238E27FC236}">
+                <a16:creationId xmlns:a16="http://schemas.microsoft.com/office/drawing/2014/main" id="{E719EEA2-C9EE-4DA6-9FFF-8E85A8FDBD6F}"/>
+              </a:ext>
+            </a:extLst>
+          </p:cNvPr>
+          <p:cNvCxnSpPr>
+            <a:stCxn id="43" idx="3"/>
+            <a:endCxn id="8" idx="1"/>
+          </p:cNvCxnSpPr>
+          <p:nvPr/>
+        </p:nvCxnSpPr>
+        <p:spPr>
+          <a:xfrm>
+            <a:off x="6320496" y="2110509"/>
+            <a:ext cx="1188830" cy="0"/>
+          </a:xfrm>
+          <a:prstGeom prst="straightConnector1">
+            <a:avLst/>
+          </a:prstGeom>
+          <a:ln>
+            <a:tailEnd type="triangle"/>
+          </a:ln>
+        </p:spPr>
+        <p:style>
+          <a:lnRef idx="1">
+            <a:schemeClr val="accent1"/>
+          </a:lnRef>
+          <a:fillRef idx="0">
+            <a:schemeClr val="accent1"/>
+          </a:fillRef>
+          <a:effectRef idx="0">
+            <a:schemeClr val="accent1"/>
+          </a:effectRef>
+          <a:fontRef idx="minor">
+            <a:schemeClr val="tx1"/>
+          </a:fontRef>
+        </p:style>
+      </p:cxnSp>
+      <p:cxnSp>
+        <p:nvCxnSpPr>
+          <p:cNvPr id="53" name="直接箭头连接符 52">
+            <a:extLst>
+              <a:ext uri="{FF2B5EF4-FFF2-40B4-BE49-F238E27FC236}">
+                <a16:creationId xmlns:a16="http://schemas.microsoft.com/office/drawing/2014/main" id="{67019E4F-A5CD-435E-8133-B0495ECFB190}"/>
+              </a:ext>
+            </a:extLst>
+          </p:cNvPr>
+          <p:cNvCxnSpPr>
+            <a:stCxn id="43" idx="2"/>
+            <a:endCxn id="36" idx="0"/>
+          </p:cNvCxnSpPr>
+          <p:nvPr/>
+        </p:nvCxnSpPr>
+        <p:spPr>
+          <a:xfrm>
+            <a:off x="5666561" y="2498436"/>
+            <a:ext cx="38972" cy="1025797"/>
+          </a:xfrm>
+          <a:prstGeom prst="straightConnector1">
+            <a:avLst/>
+          </a:prstGeom>
+          <a:ln>
+            <a:tailEnd type="triangle"/>
+          </a:ln>
+        </p:spPr>
+        <p:style>
+          <a:lnRef idx="1">
+            <a:schemeClr val="accent1"/>
+          </a:lnRef>
+          <a:fillRef idx="0">
+            <a:schemeClr val="accent1"/>
+          </a:fillRef>
+          <a:effectRef idx="0">
+            <a:schemeClr val="accent1"/>
+          </a:effectRef>
+          <a:fontRef idx="minor">
+            <a:schemeClr val="tx1"/>
+          </a:fontRef>
+        </p:style>
+      </p:cxnSp>
+      <p:cxnSp>
+        <p:nvCxnSpPr>
+          <p:cNvPr id="55" name="直接箭头连接符 54">
+            <a:extLst>
+              <a:ext uri="{FF2B5EF4-FFF2-40B4-BE49-F238E27FC236}">
+                <a16:creationId xmlns:a16="http://schemas.microsoft.com/office/drawing/2014/main" id="{C756198C-965E-41D7-B9E3-1BEE3E5D494B}"/>
+              </a:ext>
+            </a:extLst>
+          </p:cNvPr>
+          <p:cNvCxnSpPr>
+            <a:stCxn id="36" idx="3"/>
+            <a:endCxn id="8" idx="2"/>
           </p:cNvCxnSpPr>
           <p:nvPr/>
         </p:nvCxnSpPr>
         <p:spPr>
           <a:xfrm flipV="1">
-            <a:off x="3013306" y="2091748"/>
-            <a:ext cx="752417" cy="3883126"/>
+            <a:off x="6359468" y="2498436"/>
+            <a:ext cx="1803793" cy="1413724"/>
           </a:xfrm>
           <a:prstGeom prst="straightConnector1">
             <a:avLst/>

</xml_diff>

<commit_message>
ex complete. some improvement in alu.
</commit_message>
<xml_diff>
--- a/rua.pptx
+++ b/rua.pptx
@@ -6,7 +6,8 @@
   </p:sldMasterIdLst>
   <p:sldIdLst>
     <p:sldId id="256" r:id="rId2"/>
-    <p:sldId id="257" r:id="rId3"/>
+    <p:sldId id="258" r:id="rId3"/>
+    <p:sldId id="257" r:id="rId4"/>
   </p:sldIdLst>
   <p:sldSz cx="12192000" cy="6858000"/>
   <p:notesSz cx="6858000" cy="9144000"/>
@@ -105,6 +106,11 @@
       </a:defRPr>
     </a:lvl9pPr>
   </p:defaultTextStyle>
+  <p:extLst>
+    <p:ext uri="{EFAFB233-063F-42B5-8137-9DF3F51BA10A}">
+      <p15:sldGuideLst xmlns:p15="http://schemas.microsoft.com/office/powerpoint/2012/main"/>
+    </p:ext>
+  </p:extLst>
 </p:presentation>
 </file>
 
@@ -255,7 +261,7 @@
           <a:p>
             <a:fld id="{C78FFEF8-DF99-43FB-9F56-6BB9B5E85EB2}" type="datetimeFigureOut">
               <a:rPr lang="zh-CN" altLang="en-US" smtClean="0"/>
-              <a:t>2022/3/14</a:t>
+              <a:t>2022/3/20</a:t>
             </a:fld>
             <a:endParaRPr lang="zh-CN" altLang="en-US"/>
           </a:p>
@@ -453,7 +459,7 @@
           <a:p>
             <a:fld id="{C78FFEF8-DF99-43FB-9F56-6BB9B5E85EB2}" type="datetimeFigureOut">
               <a:rPr lang="zh-CN" altLang="en-US" smtClean="0"/>
-              <a:t>2022/3/14</a:t>
+              <a:t>2022/3/20</a:t>
             </a:fld>
             <a:endParaRPr lang="zh-CN" altLang="en-US"/>
           </a:p>
@@ -661,7 +667,7 @@
           <a:p>
             <a:fld id="{C78FFEF8-DF99-43FB-9F56-6BB9B5E85EB2}" type="datetimeFigureOut">
               <a:rPr lang="zh-CN" altLang="en-US" smtClean="0"/>
-              <a:t>2022/3/14</a:t>
+              <a:t>2022/3/20</a:t>
             </a:fld>
             <a:endParaRPr lang="zh-CN" altLang="en-US"/>
           </a:p>
@@ -859,7 +865,7 @@
           <a:p>
             <a:fld id="{C78FFEF8-DF99-43FB-9F56-6BB9B5E85EB2}" type="datetimeFigureOut">
               <a:rPr lang="zh-CN" altLang="en-US" smtClean="0"/>
-              <a:t>2022/3/14</a:t>
+              <a:t>2022/3/20</a:t>
             </a:fld>
             <a:endParaRPr lang="zh-CN" altLang="en-US"/>
           </a:p>
@@ -1134,7 +1140,7 @@
           <a:p>
             <a:fld id="{C78FFEF8-DF99-43FB-9F56-6BB9B5E85EB2}" type="datetimeFigureOut">
               <a:rPr lang="zh-CN" altLang="en-US" smtClean="0"/>
-              <a:t>2022/3/14</a:t>
+              <a:t>2022/3/20</a:t>
             </a:fld>
             <a:endParaRPr lang="zh-CN" altLang="en-US"/>
           </a:p>
@@ -1399,7 +1405,7 @@
           <a:p>
             <a:fld id="{C78FFEF8-DF99-43FB-9F56-6BB9B5E85EB2}" type="datetimeFigureOut">
               <a:rPr lang="zh-CN" altLang="en-US" smtClean="0"/>
-              <a:t>2022/3/14</a:t>
+              <a:t>2022/3/20</a:t>
             </a:fld>
             <a:endParaRPr lang="zh-CN" altLang="en-US"/>
           </a:p>
@@ -1811,7 +1817,7 @@
           <a:p>
             <a:fld id="{C78FFEF8-DF99-43FB-9F56-6BB9B5E85EB2}" type="datetimeFigureOut">
               <a:rPr lang="zh-CN" altLang="en-US" smtClean="0"/>
-              <a:t>2022/3/14</a:t>
+              <a:t>2022/3/20</a:t>
             </a:fld>
             <a:endParaRPr lang="zh-CN" altLang="en-US"/>
           </a:p>
@@ -1952,7 +1958,7 @@
           <a:p>
             <a:fld id="{C78FFEF8-DF99-43FB-9F56-6BB9B5E85EB2}" type="datetimeFigureOut">
               <a:rPr lang="zh-CN" altLang="en-US" smtClean="0"/>
-              <a:t>2022/3/14</a:t>
+              <a:t>2022/3/20</a:t>
             </a:fld>
             <a:endParaRPr lang="zh-CN" altLang="en-US"/>
           </a:p>
@@ -2065,7 +2071,7 @@
           <a:p>
             <a:fld id="{C78FFEF8-DF99-43FB-9F56-6BB9B5E85EB2}" type="datetimeFigureOut">
               <a:rPr lang="zh-CN" altLang="en-US" smtClean="0"/>
-              <a:t>2022/3/14</a:t>
+              <a:t>2022/3/20</a:t>
             </a:fld>
             <a:endParaRPr lang="zh-CN" altLang="en-US"/>
           </a:p>
@@ -2376,7 +2382,7 @@
           <a:p>
             <a:fld id="{C78FFEF8-DF99-43FB-9F56-6BB9B5E85EB2}" type="datetimeFigureOut">
               <a:rPr lang="zh-CN" altLang="en-US" smtClean="0"/>
-              <a:t>2022/3/14</a:t>
+              <a:t>2022/3/20</a:t>
             </a:fld>
             <a:endParaRPr lang="zh-CN" altLang="en-US"/>
           </a:p>
@@ -2664,7 +2670,7 @@
           <a:p>
             <a:fld id="{C78FFEF8-DF99-43FB-9F56-6BB9B5E85EB2}" type="datetimeFigureOut">
               <a:rPr lang="zh-CN" altLang="en-US" smtClean="0"/>
-              <a:t>2022/3/14</a:t>
+              <a:t>2022/3/20</a:t>
             </a:fld>
             <a:endParaRPr lang="zh-CN" altLang="en-US"/>
           </a:p>
@@ -2905,7 +2911,7 @@
           <a:p>
             <a:fld id="{C78FFEF8-DF99-43FB-9F56-6BB9B5E85EB2}" type="datetimeFigureOut">
               <a:rPr lang="zh-CN" altLang="en-US" smtClean="0"/>
-              <a:t>2022/3/14</a:t>
+              <a:t>2022/3/20</a:t>
             </a:fld>
             <a:endParaRPr lang="zh-CN" altLang="en-US"/>
           </a:p>
@@ -4247,6 +4253,409 @@
           <a:chExt cx="0" cy="0"/>
         </a:xfrm>
       </p:grpSpPr>
+      <p:sp>
+        <p:nvSpPr>
+          <p:cNvPr id="2" name="矩形: 圆角 1">
+            <a:extLst>
+              <a:ext uri="{FF2B5EF4-FFF2-40B4-BE49-F238E27FC236}">
+                <a16:creationId xmlns:a16="http://schemas.microsoft.com/office/drawing/2014/main" id="{44B47C5F-E11F-4056-8048-7BFEE4698140}"/>
+              </a:ext>
+            </a:extLst>
+          </p:cNvPr>
+          <p:cNvSpPr/>
+          <p:nvPr/>
+        </p:nvSpPr>
+        <p:spPr>
+          <a:xfrm>
+            <a:off x="3478253" y="1143000"/>
+            <a:ext cx="3657600" cy="4572000"/>
+          </a:xfrm>
+          <a:prstGeom prst="roundRect">
+            <a:avLst/>
+          </a:prstGeom>
+        </p:spPr>
+        <p:style>
+          <a:lnRef idx="2">
+            <a:schemeClr val="accent1"/>
+          </a:lnRef>
+          <a:fillRef idx="1">
+            <a:schemeClr val="lt1"/>
+          </a:fillRef>
+          <a:effectRef idx="0">
+            <a:schemeClr val="accent1"/>
+          </a:effectRef>
+          <a:fontRef idx="minor">
+            <a:schemeClr val="dk1"/>
+          </a:fontRef>
+        </p:style>
+        <p:txBody>
+          <a:bodyPr rtlCol="0" anchor="t" anchorCtr="0"/>
+          <a:lstStyle/>
+          <a:p>
+            <a:pPr algn="ctr"/>
+            <a:r>
+              <a:rPr lang="en-US" altLang="zh-CN" sz="1600" dirty="0">
+                <a:latin typeface="微软雅黑" panose="020B0503020204020204" pitchFamily="34" charset="-122"/>
+                <a:ea typeface="微软雅黑" panose="020B0503020204020204" pitchFamily="34" charset="-122"/>
+              </a:rPr>
+              <a:t>EX</a:t>
+            </a:r>
+            <a:endParaRPr lang="zh-CN" altLang="en-US" sz="1600" dirty="0">
+              <a:latin typeface="微软雅黑" panose="020B0503020204020204" pitchFamily="34" charset="-122"/>
+              <a:ea typeface="微软雅黑" panose="020B0503020204020204" pitchFamily="34" charset="-122"/>
+            </a:endParaRPr>
+          </a:p>
+        </p:txBody>
+      </p:sp>
+      <p:sp>
+        <p:nvSpPr>
+          <p:cNvPr id="4" name="矩形: 圆角 3">
+            <a:extLst>
+              <a:ext uri="{FF2B5EF4-FFF2-40B4-BE49-F238E27FC236}">
+                <a16:creationId xmlns:a16="http://schemas.microsoft.com/office/drawing/2014/main" id="{F5777364-2981-4F49-8DFF-123FBD2D25C5}"/>
+              </a:ext>
+            </a:extLst>
+          </p:cNvPr>
+          <p:cNvSpPr/>
+          <p:nvPr/>
+        </p:nvSpPr>
+        <p:spPr>
+          <a:xfrm>
+            <a:off x="5573899" y="2371853"/>
+            <a:ext cx="1307870" cy="775854"/>
+          </a:xfrm>
+          <a:prstGeom prst="roundRect">
+            <a:avLst/>
+          </a:prstGeom>
+        </p:spPr>
+        <p:style>
+          <a:lnRef idx="2">
+            <a:schemeClr val="accent1">
+              <a:shade val="50000"/>
+            </a:schemeClr>
+          </a:lnRef>
+          <a:fillRef idx="1">
+            <a:schemeClr val="accent1"/>
+          </a:fillRef>
+          <a:effectRef idx="0">
+            <a:schemeClr val="accent1"/>
+          </a:effectRef>
+          <a:fontRef idx="minor">
+            <a:schemeClr val="lt1"/>
+          </a:fontRef>
+        </p:style>
+        <p:txBody>
+          <a:bodyPr rtlCol="0" anchor="ctr"/>
+          <a:lstStyle/>
+          <a:p>
+            <a:pPr algn="ctr"/>
+            <a:r>
+              <a:rPr lang="en-US" altLang="zh-CN" sz="1600" dirty="0">
+                <a:latin typeface="微软雅黑" panose="020B0503020204020204" pitchFamily="34" charset="-122"/>
+                <a:ea typeface="微软雅黑" panose="020B0503020204020204" pitchFamily="34" charset="-122"/>
+              </a:rPr>
+              <a:t>ALU</a:t>
+            </a:r>
+          </a:p>
+        </p:txBody>
+      </p:sp>
+      <p:graphicFrame>
+        <p:nvGraphicFramePr>
+          <p:cNvPr id="8" name="表格 7">
+            <a:extLst>
+              <a:ext uri="{FF2B5EF4-FFF2-40B4-BE49-F238E27FC236}">
+                <a16:creationId xmlns:a16="http://schemas.microsoft.com/office/drawing/2014/main" id="{14F8E035-9CA9-4480-AD10-4F0C363DD6EF}"/>
+              </a:ext>
+            </a:extLst>
+          </p:cNvPr>
+          <p:cNvGraphicFramePr>
+            <a:graphicFrameLocks noGrp="1"/>
+          </p:cNvGraphicFramePr>
+          <p:nvPr>
+            <p:extLst>
+              <p:ext uri="{D42A27DB-BD31-4B8C-83A1-F6EECF244321}">
+                <p14:modId xmlns:p14="http://schemas.microsoft.com/office/powerpoint/2010/main" val="2720897697"/>
+              </p:ext>
+            </p:extLst>
+          </p:nvPr>
+        </p:nvGraphicFramePr>
+        <p:xfrm>
+          <a:off x="1649453" y="2233307"/>
+          <a:ext cx="1828800" cy="1828800"/>
+        </p:xfrm>
+        <a:graphic>
+          <a:graphicData uri="http://schemas.openxmlformats.org/drawingml/2006/table">
+            <a:tbl>
+              <a:tblPr firstRow="1" bandRow="1">
+                <a:tableStyleId>{2D5ABB26-0587-4C30-8999-92F81FD0307C}</a:tableStyleId>
+              </a:tblPr>
+              <a:tblGrid>
+                <a:gridCol w="1828800">
+                  <a:extLst>
+                    <a:ext uri="{9D8B030D-6E8A-4147-A177-3AD203B41FA5}">
+                      <a16:colId xmlns:a16="http://schemas.microsoft.com/office/drawing/2014/main" val="470099204"/>
+                    </a:ext>
+                  </a:extLst>
+                </a:gridCol>
+              </a:tblGrid>
+              <a:tr h="457200">
+                <a:tc>
+                  <a:txBody>
+                    <a:bodyPr/>
+                    <a:lstStyle/>
+                    <a:p>
+                      <a:pPr algn="r"/>
+                      <a:r>
+                        <a:rPr lang="en-US" altLang="zh-CN" sz="1600" dirty="0">
+                          <a:latin typeface="微软雅黑" panose="020B0503020204020204" pitchFamily="34" charset="-122"/>
+                          <a:ea typeface="微软雅黑" panose="020B0503020204020204" pitchFamily="34" charset="-122"/>
+                        </a:rPr>
+                        <a:t>PC</a:t>
+                      </a:r>
+                      <a:endParaRPr lang="zh-CN" altLang="en-US" sz="1600" dirty="0">
+                        <a:latin typeface="微软雅黑" panose="020B0503020204020204" pitchFamily="34" charset="-122"/>
+                        <a:ea typeface="微软雅黑" panose="020B0503020204020204" pitchFamily="34" charset="-122"/>
+                      </a:endParaRPr>
+                    </a:p>
+                  </a:txBody>
+                  <a:tcPr anchor="ctr">
+                    <a:lnL>
+                      <a:noFill/>
+                    </a:lnL>
+                    <a:lnR>
+                      <a:noFill/>
+                    </a:lnR>
+                    <a:lnT>
+                      <a:noFill/>
+                    </a:lnT>
+                    <a:lnB w="12700" cap="flat" cmpd="sng" algn="ctr">
+                      <a:solidFill>
+                        <a:schemeClr val="tx1"/>
+                      </a:solidFill>
+                      <a:prstDash val="solid"/>
+                      <a:round/>
+                      <a:headEnd type="none" w="med" len="med"/>
+                      <a:tailEnd type="none" w="med" len="med"/>
+                    </a:lnB>
+                    <a:lnTlToBr w="12700" cmpd="sng">
+                      <a:noFill/>
+                      <a:prstDash val="solid"/>
+                    </a:lnTlToBr>
+                    <a:lnBlToTr w="12700" cmpd="sng">
+                      <a:noFill/>
+                      <a:prstDash val="solid"/>
+                    </a:lnBlToTr>
+                  </a:tcPr>
+                </a:tc>
+                <a:extLst>
+                  <a:ext uri="{0D108BD9-81ED-4DB2-BD59-A6C34878D82A}">
+                    <a16:rowId xmlns:a16="http://schemas.microsoft.com/office/drawing/2014/main" val="1396791513"/>
+                  </a:ext>
+                </a:extLst>
+              </a:tr>
+              <a:tr h="457200">
+                <a:tc>
+                  <a:txBody>
+                    <a:bodyPr/>
+                    <a:lstStyle/>
+                    <a:p>
+                      <a:pPr algn="r"/>
+                      <a:r>
+                        <a:rPr lang="en-US" altLang="zh-CN" sz="1600" dirty="0" err="1">
+                          <a:latin typeface="微软雅黑" panose="020B0503020204020204" pitchFamily="34" charset="-122"/>
+                          <a:ea typeface="微软雅黑" panose="020B0503020204020204" pitchFamily="34" charset="-122"/>
+                        </a:rPr>
+                        <a:t>inst</a:t>
+                      </a:r>
+                      <a:endParaRPr lang="zh-CN" altLang="en-US" sz="1600" dirty="0">
+                        <a:latin typeface="微软雅黑" panose="020B0503020204020204" pitchFamily="34" charset="-122"/>
+                        <a:ea typeface="微软雅黑" panose="020B0503020204020204" pitchFamily="34" charset="-122"/>
+                      </a:endParaRPr>
+                    </a:p>
+                  </a:txBody>
+                  <a:tcPr anchor="ctr">
+                    <a:lnL>
+                      <a:noFill/>
+                    </a:lnL>
+                    <a:lnR>
+                      <a:noFill/>
+                    </a:lnR>
+                    <a:lnT w="12700" cap="flat" cmpd="sng" algn="ctr">
+                      <a:solidFill>
+                        <a:schemeClr val="tx1"/>
+                      </a:solidFill>
+                      <a:prstDash val="solid"/>
+                      <a:round/>
+                      <a:headEnd type="none" w="med" len="med"/>
+                      <a:tailEnd type="none" w="med" len="med"/>
+                    </a:lnT>
+                    <a:lnB w="12700" cap="flat" cmpd="sng" algn="ctr">
+                      <a:solidFill>
+                        <a:schemeClr val="tx1"/>
+                      </a:solidFill>
+                      <a:prstDash val="solid"/>
+                      <a:round/>
+                      <a:headEnd type="none" w="med" len="med"/>
+                      <a:tailEnd type="none" w="med" len="med"/>
+                    </a:lnB>
+                    <a:lnTlToBr w="12700" cmpd="sng">
+                      <a:noFill/>
+                      <a:prstDash val="solid"/>
+                    </a:lnTlToBr>
+                    <a:lnBlToTr w="12700" cmpd="sng">
+                      <a:noFill/>
+                      <a:prstDash val="solid"/>
+                    </a:lnBlToTr>
+                  </a:tcPr>
+                </a:tc>
+                <a:extLst>
+                  <a:ext uri="{0D108BD9-81ED-4DB2-BD59-A6C34878D82A}">
+                    <a16:rowId xmlns:a16="http://schemas.microsoft.com/office/drawing/2014/main" val="1453576610"/>
+                  </a:ext>
+                </a:extLst>
+              </a:tr>
+              <a:tr h="457200">
+                <a:tc>
+                  <a:txBody>
+                    <a:bodyPr/>
+                    <a:lstStyle/>
+                    <a:p>
+                      <a:pPr algn="r"/>
+                      <a:endParaRPr lang="zh-CN" altLang="en-US" sz="1600" dirty="0">
+                        <a:latin typeface="微软雅黑" panose="020B0503020204020204" pitchFamily="34" charset="-122"/>
+                        <a:ea typeface="微软雅黑" panose="020B0503020204020204" pitchFamily="34" charset="-122"/>
+                      </a:endParaRPr>
+                    </a:p>
+                  </a:txBody>
+                  <a:tcPr anchor="ctr">
+                    <a:lnL>
+                      <a:noFill/>
+                    </a:lnL>
+                    <a:lnR>
+                      <a:noFill/>
+                    </a:lnR>
+                    <a:lnT w="12700" cap="flat" cmpd="sng" algn="ctr">
+                      <a:solidFill>
+                        <a:schemeClr val="tx1"/>
+                      </a:solidFill>
+                      <a:prstDash val="solid"/>
+                      <a:round/>
+                      <a:headEnd type="none" w="med" len="med"/>
+                      <a:tailEnd type="none" w="med" len="med"/>
+                    </a:lnT>
+                    <a:lnB w="12700" cap="flat" cmpd="sng" algn="ctr">
+                      <a:solidFill>
+                        <a:schemeClr val="tx1"/>
+                      </a:solidFill>
+                      <a:prstDash val="solid"/>
+                      <a:round/>
+                      <a:headEnd type="none" w="med" len="med"/>
+                      <a:tailEnd type="none" w="med" len="med"/>
+                    </a:lnB>
+                    <a:lnTlToBr w="12700" cmpd="sng">
+                      <a:noFill/>
+                      <a:prstDash val="solid"/>
+                    </a:lnTlToBr>
+                    <a:lnBlToTr w="12700" cmpd="sng">
+                      <a:noFill/>
+                      <a:prstDash val="solid"/>
+                    </a:lnBlToTr>
+                  </a:tcPr>
+                </a:tc>
+                <a:extLst>
+                  <a:ext uri="{0D108BD9-81ED-4DB2-BD59-A6C34878D82A}">
+                    <a16:rowId xmlns:a16="http://schemas.microsoft.com/office/drawing/2014/main" val="2799762644"/>
+                  </a:ext>
+                </a:extLst>
+              </a:tr>
+              <a:tr h="457200">
+                <a:tc>
+                  <a:txBody>
+                    <a:bodyPr/>
+                    <a:lstStyle/>
+                    <a:p>
+                      <a:pPr algn="r"/>
+                      <a:endParaRPr lang="zh-CN" altLang="en-US" sz="1600" dirty="0">
+                        <a:latin typeface="微软雅黑" panose="020B0503020204020204" pitchFamily="34" charset="-122"/>
+                        <a:ea typeface="微软雅黑" panose="020B0503020204020204" pitchFamily="34" charset="-122"/>
+                      </a:endParaRPr>
+                    </a:p>
+                  </a:txBody>
+                  <a:tcPr anchor="ctr">
+                    <a:lnL>
+                      <a:noFill/>
+                    </a:lnL>
+                    <a:lnR>
+                      <a:noFill/>
+                    </a:lnR>
+                    <a:lnT w="12700" cap="flat" cmpd="sng" algn="ctr">
+                      <a:solidFill>
+                        <a:schemeClr val="tx1"/>
+                      </a:solidFill>
+                      <a:prstDash val="solid"/>
+                      <a:round/>
+                      <a:headEnd type="none" w="med" len="med"/>
+                      <a:tailEnd type="none" w="med" len="med"/>
+                    </a:lnT>
+                    <a:lnB w="12700" cap="flat" cmpd="sng" algn="ctr">
+                      <a:solidFill>
+                        <a:schemeClr val="tx1"/>
+                      </a:solidFill>
+                      <a:prstDash val="solid"/>
+                      <a:round/>
+                      <a:headEnd type="none" w="med" len="med"/>
+                      <a:tailEnd type="none" w="med" len="med"/>
+                    </a:lnB>
+                    <a:lnTlToBr w="12700" cmpd="sng">
+                      <a:noFill/>
+                      <a:prstDash val="solid"/>
+                    </a:lnTlToBr>
+                    <a:lnBlToTr w="12700" cmpd="sng">
+                      <a:noFill/>
+                      <a:prstDash val="solid"/>
+                    </a:lnBlToTr>
+                  </a:tcPr>
+                </a:tc>
+                <a:extLst>
+                  <a:ext uri="{0D108BD9-81ED-4DB2-BD59-A6C34878D82A}">
+                    <a16:rowId xmlns:a16="http://schemas.microsoft.com/office/drawing/2014/main" val="2733463249"/>
+                  </a:ext>
+                </a:extLst>
+              </a:tr>
+            </a:tbl>
+          </a:graphicData>
+        </a:graphic>
+      </p:graphicFrame>
+    </p:spTree>
+    <p:extLst>
+      <p:ext uri="{BB962C8B-B14F-4D97-AF65-F5344CB8AC3E}">
+        <p14:creationId xmlns:p14="http://schemas.microsoft.com/office/powerpoint/2010/main" val="4031249968"/>
+      </p:ext>
+    </p:extLst>
+  </p:cSld>
+  <p:clrMapOvr>
+    <a:masterClrMapping/>
+  </p:clrMapOvr>
+</p:sld>
+</file>
+
+<file path=ppt/slides/slide3.xml><?xml version="1.0" encoding="utf-8"?>
+<p:sld xmlns:a="http://schemas.openxmlformats.org/drawingml/2006/main" xmlns:r="http://schemas.openxmlformats.org/officeDocument/2006/relationships" xmlns:p="http://schemas.openxmlformats.org/presentationml/2006/main">
+  <p:cSld>
+    <p:spTree>
+      <p:nvGrpSpPr>
+        <p:cNvPr id="1" name=""/>
+        <p:cNvGrpSpPr/>
+        <p:nvPr/>
+      </p:nvGrpSpPr>
+      <p:grpSpPr>
+        <a:xfrm>
+          <a:off x="0" y="0"/>
+          <a:ext cx="0" cy="0"/>
+          <a:chOff x="0" y="0"/>
+          <a:chExt cx="0" cy="0"/>
+        </a:xfrm>
+      </p:grpSpPr>
       <p:cxnSp>
         <p:nvCxnSpPr>
           <p:cNvPr id="13" name="直接箭头连接符 12">

</xml_diff>

<commit_message>
add mem and ram. fix several bugs in id and ex.
</commit_message>
<xml_diff>
--- a/rua.pptx
+++ b/rua.pptx
@@ -261,7 +261,7 @@
           <a:p>
             <a:fld id="{C78FFEF8-DF99-43FB-9F56-6BB9B5E85EB2}" type="datetimeFigureOut">
               <a:rPr lang="zh-CN" altLang="en-US" smtClean="0"/>
-              <a:t>2022/3/20</a:t>
+              <a:t>2022/3/27</a:t>
             </a:fld>
             <a:endParaRPr lang="zh-CN" altLang="en-US"/>
           </a:p>
@@ -459,7 +459,7 @@
           <a:p>
             <a:fld id="{C78FFEF8-DF99-43FB-9F56-6BB9B5E85EB2}" type="datetimeFigureOut">
               <a:rPr lang="zh-CN" altLang="en-US" smtClean="0"/>
-              <a:t>2022/3/20</a:t>
+              <a:t>2022/3/27</a:t>
             </a:fld>
             <a:endParaRPr lang="zh-CN" altLang="en-US"/>
           </a:p>
@@ -667,7 +667,7 @@
           <a:p>
             <a:fld id="{C78FFEF8-DF99-43FB-9F56-6BB9B5E85EB2}" type="datetimeFigureOut">
               <a:rPr lang="zh-CN" altLang="en-US" smtClean="0"/>
-              <a:t>2022/3/20</a:t>
+              <a:t>2022/3/27</a:t>
             </a:fld>
             <a:endParaRPr lang="zh-CN" altLang="en-US"/>
           </a:p>
@@ -865,7 +865,7 @@
           <a:p>
             <a:fld id="{C78FFEF8-DF99-43FB-9F56-6BB9B5E85EB2}" type="datetimeFigureOut">
               <a:rPr lang="zh-CN" altLang="en-US" smtClean="0"/>
-              <a:t>2022/3/20</a:t>
+              <a:t>2022/3/27</a:t>
             </a:fld>
             <a:endParaRPr lang="zh-CN" altLang="en-US"/>
           </a:p>
@@ -1140,7 +1140,7 @@
           <a:p>
             <a:fld id="{C78FFEF8-DF99-43FB-9F56-6BB9B5E85EB2}" type="datetimeFigureOut">
               <a:rPr lang="zh-CN" altLang="en-US" smtClean="0"/>
-              <a:t>2022/3/20</a:t>
+              <a:t>2022/3/27</a:t>
             </a:fld>
             <a:endParaRPr lang="zh-CN" altLang="en-US"/>
           </a:p>
@@ -1405,7 +1405,7 @@
           <a:p>
             <a:fld id="{C78FFEF8-DF99-43FB-9F56-6BB9B5E85EB2}" type="datetimeFigureOut">
               <a:rPr lang="zh-CN" altLang="en-US" smtClean="0"/>
-              <a:t>2022/3/20</a:t>
+              <a:t>2022/3/27</a:t>
             </a:fld>
             <a:endParaRPr lang="zh-CN" altLang="en-US"/>
           </a:p>
@@ -1817,7 +1817,7 @@
           <a:p>
             <a:fld id="{C78FFEF8-DF99-43FB-9F56-6BB9B5E85EB2}" type="datetimeFigureOut">
               <a:rPr lang="zh-CN" altLang="en-US" smtClean="0"/>
-              <a:t>2022/3/20</a:t>
+              <a:t>2022/3/27</a:t>
             </a:fld>
             <a:endParaRPr lang="zh-CN" altLang="en-US"/>
           </a:p>
@@ -1958,7 +1958,7 @@
           <a:p>
             <a:fld id="{C78FFEF8-DF99-43FB-9F56-6BB9B5E85EB2}" type="datetimeFigureOut">
               <a:rPr lang="zh-CN" altLang="en-US" smtClean="0"/>
-              <a:t>2022/3/20</a:t>
+              <a:t>2022/3/27</a:t>
             </a:fld>
             <a:endParaRPr lang="zh-CN" altLang="en-US"/>
           </a:p>
@@ -2071,7 +2071,7 @@
           <a:p>
             <a:fld id="{C78FFEF8-DF99-43FB-9F56-6BB9B5E85EB2}" type="datetimeFigureOut">
               <a:rPr lang="zh-CN" altLang="en-US" smtClean="0"/>
-              <a:t>2022/3/20</a:t>
+              <a:t>2022/3/27</a:t>
             </a:fld>
             <a:endParaRPr lang="zh-CN" altLang="en-US"/>
           </a:p>
@@ -2382,7 +2382,7 @@
           <a:p>
             <a:fld id="{C78FFEF8-DF99-43FB-9F56-6BB9B5E85EB2}" type="datetimeFigureOut">
               <a:rPr lang="zh-CN" altLang="en-US" smtClean="0"/>
-              <a:t>2022/3/20</a:t>
+              <a:t>2022/3/27</a:t>
             </a:fld>
             <a:endParaRPr lang="zh-CN" altLang="en-US"/>
           </a:p>
@@ -2670,7 +2670,7 @@
           <a:p>
             <a:fld id="{C78FFEF8-DF99-43FB-9F56-6BB9B5E85EB2}" type="datetimeFigureOut">
               <a:rPr lang="zh-CN" altLang="en-US" smtClean="0"/>
-              <a:t>2022/3/20</a:t>
+              <a:t>2022/3/27</a:t>
             </a:fld>
             <a:endParaRPr lang="zh-CN" altLang="en-US"/>
           </a:p>
@@ -2911,7 +2911,7 @@
           <a:p>
             <a:fld id="{C78FFEF8-DF99-43FB-9F56-6BB9B5E85EB2}" type="datetimeFigureOut">
               <a:rPr lang="zh-CN" altLang="en-US" smtClean="0"/>
-              <a:t>2022/3/20</a:t>
+              <a:t>2022/3/27</a:t>
             </a:fld>
             <a:endParaRPr lang="zh-CN" altLang="en-US"/>
           </a:p>
@@ -3342,7 +3342,7 @@
         </p:nvSpPr>
         <p:spPr>
           <a:xfrm>
-            <a:off x="274987" y="1722582"/>
+            <a:off x="157620" y="2964153"/>
             <a:ext cx="1307870" cy="775854"/>
           </a:xfrm>
           <a:prstGeom prst="roundRect">
@@ -3394,7 +3394,7 @@
         </p:nvSpPr>
         <p:spPr>
           <a:xfrm>
-            <a:off x="7919935" y="1568288"/>
+            <a:off x="6534751" y="2964153"/>
             <a:ext cx="1307870" cy="775854"/>
           </a:xfrm>
           <a:prstGeom prst="roundRect">
@@ -3484,7 +3484,7 @@
         </p:nvSpPr>
         <p:spPr>
           <a:xfrm>
-            <a:off x="152408" y="4617333"/>
+            <a:off x="209558" y="5062186"/>
             <a:ext cx="11772883" cy="775854"/>
           </a:xfrm>
           <a:prstGeom prst="roundRect">
@@ -3524,58 +3524,6 @@
               <a:latin typeface="微软雅黑" panose="020B0503020204020204" pitchFamily="34" charset="-122"/>
               <a:ea typeface="微软雅黑" panose="020B0503020204020204" pitchFamily="34" charset="-122"/>
             </a:endParaRPr>
-          </a:p>
-        </p:txBody>
-      </p:sp>
-      <p:sp>
-        <p:nvSpPr>
-          <p:cNvPr id="25" name="矩形: 圆角 24">
-            <a:extLst>
-              <a:ext uri="{FF2B5EF4-FFF2-40B4-BE49-F238E27FC236}">
-                <a16:creationId xmlns:a16="http://schemas.microsoft.com/office/drawing/2014/main" id="{ADD4D9C9-0AA4-434E-8632-68183774A61A}"/>
-              </a:ext>
-            </a:extLst>
-          </p:cNvPr>
-          <p:cNvSpPr/>
-          <p:nvPr/>
-        </p:nvSpPr>
-        <p:spPr>
-          <a:xfrm>
-            <a:off x="2515926" y="6082146"/>
-            <a:ext cx="1307870" cy="775854"/>
-          </a:xfrm>
-          <a:prstGeom prst="roundRect">
-            <a:avLst/>
-          </a:prstGeom>
-        </p:spPr>
-        <p:style>
-          <a:lnRef idx="2">
-            <a:schemeClr val="accent1">
-              <a:shade val="50000"/>
-            </a:schemeClr>
-          </a:lnRef>
-          <a:fillRef idx="1">
-            <a:schemeClr val="accent1"/>
-          </a:fillRef>
-          <a:effectRef idx="0">
-            <a:schemeClr val="accent1"/>
-          </a:effectRef>
-          <a:fontRef idx="minor">
-            <a:schemeClr val="lt1"/>
-          </a:fontRef>
-        </p:style>
-        <p:txBody>
-          <a:bodyPr rtlCol="0" anchor="ctr"/>
-          <a:lstStyle/>
-          <a:p>
-            <a:pPr algn="ctr"/>
-            <a:r>
-              <a:rPr lang="en-US" altLang="zh-CN" sz="1600" dirty="0">
-                <a:latin typeface="微软雅黑" panose="020B0503020204020204" pitchFamily="34" charset="-122"/>
-                <a:ea typeface="微软雅黑" panose="020B0503020204020204" pitchFamily="34" charset="-122"/>
-              </a:rPr>
-              <a:t>ROM</a:t>
-            </a:r>
           </a:p>
         </p:txBody>
       </p:sp>
@@ -3697,7 +3645,7 @@
         </p:nvSpPr>
         <p:spPr>
           <a:xfrm>
-            <a:off x="2515926" y="1722582"/>
+            <a:off x="1979883" y="2964153"/>
             <a:ext cx="1307870" cy="775854"/>
           </a:xfrm>
           <a:prstGeom prst="roundRect">
@@ -3749,7 +3697,7 @@
         </p:nvSpPr>
         <p:spPr>
           <a:xfrm>
-            <a:off x="5118180" y="3368530"/>
+            <a:off x="4173945" y="4042226"/>
             <a:ext cx="1307870" cy="775854"/>
           </a:xfrm>
           <a:prstGeom prst="roundRect">
@@ -3787,48 +3735,6 @@
           </a:p>
         </p:txBody>
       </p:sp>
-      <p:cxnSp>
-        <p:nvCxnSpPr>
-          <p:cNvPr id="40" name="直接箭头连接符 39">
-            <a:extLst>
-              <a:ext uri="{FF2B5EF4-FFF2-40B4-BE49-F238E27FC236}">
-                <a16:creationId xmlns:a16="http://schemas.microsoft.com/office/drawing/2014/main" id="{49AD9B03-BFCF-48EC-B800-BA5F494AFE1D}"/>
-              </a:ext>
-            </a:extLst>
-          </p:cNvPr>
-          <p:cNvCxnSpPr>
-            <a:stCxn id="25" idx="0"/>
-            <a:endCxn id="28" idx="2"/>
-          </p:cNvCxnSpPr>
-          <p:nvPr/>
-        </p:nvCxnSpPr>
-        <p:spPr>
-          <a:xfrm flipV="1">
-            <a:off x="3169861" y="2498436"/>
-            <a:ext cx="0" cy="3583710"/>
-          </a:xfrm>
-          <a:prstGeom prst="straightConnector1">
-            <a:avLst/>
-          </a:prstGeom>
-          <a:ln>
-            <a:tailEnd type="triangle"/>
-          </a:ln>
-        </p:spPr>
-        <p:style>
-          <a:lnRef idx="1">
-            <a:schemeClr val="accent1"/>
-          </a:lnRef>
-          <a:fillRef idx="0">
-            <a:schemeClr val="accent1"/>
-          </a:fillRef>
-          <a:effectRef idx="0">
-            <a:schemeClr val="accent1"/>
-          </a:effectRef>
-          <a:fontRef idx="minor">
-            <a:schemeClr val="tx1"/>
-          </a:fontRef>
-        </p:style>
-      </p:cxnSp>
       <p:sp>
         <p:nvSpPr>
           <p:cNvPr id="43" name="矩形: 圆角 42">
@@ -3843,7 +3749,7 @@
         </p:nvSpPr>
         <p:spPr>
           <a:xfrm>
-            <a:off x="5115098" y="1610429"/>
+            <a:off x="4173945" y="2964153"/>
             <a:ext cx="1307870" cy="775854"/>
           </a:xfrm>
           <a:prstGeom prst="roundRect">
@@ -3898,8 +3804,8 @@
         </p:nvCxnSpPr>
         <p:spPr>
           <a:xfrm>
-            <a:off x="1582857" y="2110509"/>
-            <a:ext cx="933069" cy="0"/>
+            <a:off x="1465490" y="3352080"/>
+            <a:ext cx="514393" cy="0"/>
           </a:xfrm>
           <a:prstGeom prst="straightConnector1">
             <a:avLst/>
@@ -3939,9 +3845,9 @@
           <p:nvPr/>
         </p:nvCxnSpPr>
         <p:spPr>
-          <a:xfrm flipV="1">
-            <a:off x="3823796" y="1998356"/>
-            <a:ext cx="1291302" cy="112153"/>
+          <a:xfrm>
+            <a:off x="3287753" y="3352080"/>
+            <a:ext cx="886192" cy="0"/>
           </a:xfrm>
           <a:prstGeom prst="straightConnector1">
             <a:avLst/>
@@ -3981,9 +3887,9 @@
           <p:nvPr/>
         </p:nvCxnSpPr>
         <p:spPr>
-          <a:xfrm flipV="1">
-            <a:off x="6422968" y="1956215"/>
-            <a:ext cx="1496967" cy="42141"/>
+          <a:xfrm>
+            <a:off x="5481815" y="3352080"/>
+            <a:ext cx="1052936" cy="0"/>
           </a:xfrm>
           <a:prstGeom prst="straightConnector1">
             <a:avLst/>
@@ -4024,50 +3930,8 @@
         </p:nvCxnSpPr>
         <p:spPr>
           <a:xfrm>
-            <a:off x="5769033" y="2386283"/>
-            <a:ext cx="3082" cy="982247"/>
-          </a:xfrm>
-          <a:prstGeom prst="straightConnector1">
-            <a:avLst/>
-          </a:prstGeom>
-          <a:ln>
-            <a:tailEnd type="triangle"/>
-          </a:ln>
-        </p:spPr>
-        <p:style>
-          <a:lnRef idx="1">
-            <a:schemeClr val="accent1"/>
-          </a:lnRef>
-          <a:fillRef idx="0">
-            <a:schemeClr val="accent1"/>
-          </a:fillRef>
-          <a:effectRef idx="0">
-            <a:schemeClr val="accent1"/>
-          </a:effectRef>
-          <a:fontRef idx="minor">
-            <a:schemeClr val="tx1"/>
-          </a:fontRef>
-        </p:style>
-      </p:cxnSp>
-      <p:cxnSp>
-        <p:nvCxnSpPr>
-          <p:cNvPr id="55" name="直接箭头连接符 54">
-            <a:extLst>
-              <a:ext uri="{FF2B5EF4-FFF2-40B4-BE49-F238E27FC236}">
-                <a16:creationId xmlns:a16="http://schemas.microsoft.com/office/drawing/2014/main" id="{C756198C-965E-41D7-B9E3-1BEE3E5D494B}"/>
-              </a:ext>
-            </a:extLst>
-          </p:cNvPr>
-          <p:cNvCxnSpPr>
-            <a:stCxn id="36" idx="3"/>
-            <a:endCxn id="8" idx="2"/>
-          </p:cNvCxnSpPr>
-          <p:nvPr/>
-        </p:nvCxnSpPr>
-        <p:spPr>
-          <a:xfrm flipV="1">
-            <a:off x="6426050" y="2344142"/>
-            <a:ext cx="2147820" cy="1412315"/>
+            <a:off x="4827880" y="3740007"/>
+            <a:ext cx="0" cy="302219"/>
           </a:xfrm>
           <a:prstGeom prst="straightConnector1">
             <a:avLst/>
@@ -4100,13 +3964,15 @@
               </a:ext>
             </a:extLst>
           </p:cNvPr>
-          <p:cNvCxnSpPr/>
+          <p:cNvCxnSpPr>
+            <a:cxnSpLocks/>
+          </p:cNvCxnSpPr>
           <p:nvPr/>
         </p:nvCxnSpPr>
         <p:spPr>
           <a:xfrm>
-            <a:off x="4229100" y="352408"/>
-            <a:ext cx="0" cy="3947679"/>
+            <a:off x="3536641" y="1941771"/>
+            <a:ext cx="0" cy="2177468"/>
           </a:xfrm>
           <a:prstGeom prst="line">
             <a:avLst/>
@@ -4138,23 +4004,263 @@
       </p:cxnSp>
       <p:cxnSp>
         <p:nvCxnSpPr>
-          <p:cNvPr id="70" name="连接符: 肘形 69">
+          <p:cNvPr id="72" name="直接连接符 71">
             <a:extLst>
               <a:ext uri="{FF2B5EF4-FFF2-40B4-BE49-F238E27FC236}">
-                <a16:creationId xmlns:a16="http://schemas.microsoft.com/office/drawing/2014/main" id="{0DA81F82-2F43-419B-914B-4D751B95825B}"/>
+                <a16:creationId xmlns:a16="http://schemas.microsoft.com/office/drawing/2014/main" id="{8E1BCE9D-3EE2-4FB8-8922-22CA03785A25}"/>
+              </a:ext>
+            </a:extLst>
+          </p:cNvPr>
+          <p:cNvCxnSpPr>
+            <a:cxnSpLocks/>
+          </p:cNvCxnSpPr>
+          <p:nvPr/>
+        </p:nvCxnSpPr>
+        <p:spPr>
+          <a:xfrm>
+            <a:off x="6116213" y="1941771"/>
+            <a:ext cx="19536" cy="2177468"/>
+          </a:xfrm>
+          <a:prstGeom prst="line">
+            <a:avLst/>
+          </a:prstGeom>
+          <a:ln w="9525" cap="flat" cmpd="sng" algn="ctr">
+            <a:solidFill>
+              <a:schemeClr val="accent1"/>
+            </a:solidFill>
+            <a:prstDash val="dash"/>
+            <a:round/>
+            <a:headEnd type="none" w="med" len="med"/>
+            <a:tailEnd type="none" w="med" len="med"/>
+          </a:ln>
+        </p:spPr>
+        <p:style>
+          <a:lnRef idx="0">
+            <a:scrgbClr r="0" g="0" b="0"/>
+          </a:lnRef>
+          <a:fillRef idx="0">
+            <a:scrgbClr r="0" g="0" b="0"/>
+          </a:fillRef>
+          <a:effectRef idx="0">
+            <a:scrgbClr r="0" g="0" b="0"/>
+          </a:effectRef>
+          <a:fontRef idx="minor">
+            <a:schemeClr val="tx1"/>
+          </a:fontRef>
+        </p:style>
+      </p:cxnSp>
+      <p:sp>
+        <p:nvSpPr>
+          <p:cNvPr id="57" name="矩形: 圆角 56">
+            <a:extLst>
+              <a:ext uri="{FF2B5EF4-FFF2-40B4-BE49-F238E27FC236}">
+                <a16:creationId xmlns:a16="http://schemas.microsoft.com/office/drawing/2014/main" id="{63D743C8-CFA8-4073-AEA5-3AF1AABD55E7}"/>
+              </a:ext>
+            </a:extLst>
+          </p:cNvPr>
+          <p:cNvSpPr/>
+          <p:nvPr/>
+        </p:nvSpPr>
+        <p:spPr>
+          <a:xfrm>
+            <a:off x="9022139" y="2964153"/>
+            <a:ext cx="1307870" cy="775854"/>
+          </a:xfrm>
+          <a:prstGeom prst="roundRect">
+            <a:avLst/>
+          </a:prstGeom>
+        </p:spPr>
+        <p:style>
+          <a:lnRef idx="2">
+            <a:schemeClr val="accent1">
+              <a:shade val="50000"/>
+            </a:schemeClr>
+          </a:lnRef>
+          <a:fillRef idx="1">
+            <a:schemeClr val="accent1"/>
+          </a:fillRef>
+          <a:effectRef idx="0">
+            <a:schemeClr val="accent1"/>
+          </a:effectRef>
+          <a:fontRef idx="minor">
+            <a:schemeClr val="lt1"/>
+          </a:fontRef>
+        </p:style>
+        <p:txBody>
+          <a:bodyPr rtlCol="0" anchor="ctr"/>
+          <a:lstStyle/>
+          <a:p>
+            <a:pPr algn="ctr"/>
+            <a:r>
+              <a:rPr lang="en-US" altLang="zh-CN" sz="1600" dirty="0">
+                <a:latin typeface="微软雅黑" panose="020B0503020204020204" pitchFamily="34" charset="-122"/>
+                <a:ea typeface="微软雅黑" panose="020B0503020204020204" pitchFamily="34" charset="-122"/>
+              </a:rPr>
+              <a:t>MEM</a:t>
+            </a:r>
+          </a:p>
+        </p:txBody>
+      </p:sp>
+      <p:cxnSp>
+        <p:nvCxnSpPr>
+          <p:cNvPr id="58" name="直接箭头连接符 57">
+            <a:extLst>
+              <a:ext uri="{FF2B5EF4-FFF2-40B4-BE49-F238E27FC236}">
+                <a16:creationId xmlns:a16="http://schemas.microsoft.com/office/drawing/2014/main" id="{53B2D8E1-4B08-4D42-93FC-4CF5E524FFB4}"/>
               </a:ext>
             </a:extLst>
           </p:cNvPr>
           <p:cNvCxnSpPr>
             <a:stCxn id="8" idx="3"/>
-            <a:endCxn id="26" idx="0"/>
+            <a:endCxn id="57" idx="1"/>
           </p:cNvCxnSpPr>
           <p:nvPr/>
         </p:nvCxnSpPr>
         <p:spPr>
           <a:xfrm>
-            <a:off x="9227805" y="1956215"/>
-            <a:ext cx="448269" cy="4125931"/>
+            <a:off x="7842621" y="3352080"/>
+            <a:ext cx="1179518" cy="0"/>
+          </a:xfrm>
+          <a:prstGeom prst="straightConnector1">
+            <a:avLst/>
+          </a:prstGeom>
+          <a:ln>
+            <a:tailEnd type="triangle"/>
+          </a:ln>
+        </p:spPr>
+        <p:style>
+          <a:lnRef idx="1">
+            <a:schemeClr val="accent1"/>
+          </a:lnRef>
+          <a:fillRef idx="0">
+            <a:schemeClr val="accent1"/>
+          </a:fillRef>
+          <a:effectRef idx="0">
+            <a:schemeClr val="accent1"/>
+          </a:effectRef>
+          <a:fontRef idx="minor">
+            <a:schemeClr val="tx1"/>
+          </a:fontRef>
+        </p:style>
+      </p:cxnSp>
+      <p:sp>
+        <p:nvSpPr>
+          <p:cNvPr id="67" name="矩形: 圆角 66">
+            <a:extLst>
+              <a:ext uri="{FF2B5EF4-FFF2-40B4-BE49-F238E27FC236}">
+                <a16:creationId xmlns:a16="http://schemas.microsoft.com/office/drawing/2014/main" id="{B42E01A9-1990-4FD9-9EEF-9209C4373A74}"/>
+              </a:ext>
+            </a:extLst>
+          </p:cNvPr>
+          <p:cNvSpPr/>
+          <p:nvPr/>
+        </p:nvSpPr>
+        <p:spPr>
+          <a:xfrm>
+            <a:off x="5481815" y="232724"/>
+            <a:ext cx="1307870" cy="775854"/>
+          </a:xfrm>
+          <a:prstGeom prst="roundRect">
+            <a:avLst/>
+          </a:prstGeom>
+        </p:spPr>
+        <p:style>
+          <a:lnRef idx="2">
+            <a:schemeClr val="accent1">
+              <a:shade val="50000"/>
+            </a:schemeClr>
+          </a:lnRef>
+          <a:fillRef idx="1">
+            <a:schemeClr val="accent1"/>
+          </a:fillRef>
+          <a:effectRef idx="0">
+            <a:schemeClr val="accent1"/>
+          </a:effectRef>
+          <a:fontRef idx="minor">
+            <a:schemeClr val="lt1"/>
+          </a:fontRef>
+        </p:style>
+        <p:txBody>
+          <a:bodyPr rtlCol="0" anchor="ctr"/>
+          <a:lstStyle/>
+          <a:p>
+            <a:pPr algn="ctr"/>
+            <a:r>
+              <a:rPr lang="en-US" altLang="zh-CN" sz="1600" dirty="0">
+                <a:latin typeface="微软雅黑" panose="020B0503020204020204" pitchFamily="34" charset="-122"/>
+                <a:ea typeface="微软雅黑" panose="020B0503020204020204" pitchFamily="34" charset="-122"/>
+              </a:rPr>
+              <a:t>CTRL</a:t>
+            </a:r>
+          </a:p>
+        </p:txBody>
+      </p:sp>
+      <p:cxnSp>
+        <p:nvCxnSpPr>
+          <p:cNvPr id="69" name="直接连接符 68">
+            <a:extLst>
+              <a:ext uri="{FF2B5EF4-FFF2-40B4-BE49-F238E27FC236}">
+                <a16:creationId xmlns:a16="http://schemas.microsoft.com/office/drawing/2014/main" id="{C9C53941-5784-4668-BDA1-84C32F69E59C}"/>
+              </a:ext>
+            </a:extLst>
+          </p:cNvPr>
+          <p:cNvCxnSpPr>
+            <a:cxnSpLocks/>
+          </p:cNvCxnSpPr>
+          <p:nvPr/>
+        </p:nvCxnSpPr>
+        <p:spPr>
+          <a:xfrm>
+            <a:off x="8432380" y="1941771"/>
+            <a:ext cx="0" cy="2177468"/>
+          </a:xfrm>
+          <a:prstGeom prst="line">
+            <a:avLst/>
+          </a:prstGeom>
+          <a:ln w="9525" cap="flat" cmpd="sng" algn="ctr">
+            <a:solidFill>
+              <a:schemeClr val="accent1"/>
+            </a:solidFill>
+            <a:prstDash val="dash"/>
+            <a:round/>
+            <a:headEnd type="none" w="med" len="med"/>
+            <a:tailEnd type="none" w="med" len="med"/>
+          </a:ln>
+        </p:spPr>
+        <p:style>
+          <a:lnRef idx="0">
+            <a:scrgbClr r="0" g="0" b="0"/>
+          </a:lnRef>
+          <a:fillRef idx="0">
+            <a:scrgbClr r="0" g="0" b="0"/>
+          </a:fillRef>
+          <a:effectRef idx="0">
+            <a:scrgbClr r="0" g="0" b="0"/>
+          </a:effectRef>
+          <a:fontRef idx="minor">
+            <a:schemeClr val="tx1"/>
+          </a:fontRef>
+        </p:style>
+      </p:cxnSp>
+      <p:cxnSp>
+        <p:nvCxnSpPr>
+          <p:cNvPr id="74" name="连接符: 肘形 73">
+            <a:extLst>
+              <a:ext uri="{FF2B5EF4-FFF2-40B4-BE49-F238E27FC236}">
+                <a16:creationId xmlns:a16="http://schemas.microsoft.com/office/drawing/2014/main" id="{1B9A84D3-F343-4519-B68E-368A6E63E394}"/>
+              </a:ext>
+            </a:extLst>
+          </p:cNvPr>
+          <p:cNvCxnSpPr>
+            <a:cxnSpLocks/>
+            <a:stCxn id="8" idx="2"/>
+          </p:cNvCxnSpPr>
+          <p:nvPr/>
+        </p:nvCxnSpPr>
+        <p:spPr>
+          <a:xfrm rot="5400000">
+            <a:off x="6063489" y="3158334"/>
+            <a:ext cx="543525" cy="1706871"/>
           </a:xfrm>
           <a:prstGeom prst="bentConnector2">
             <a:avLst/>
@@ -4180,10 +4286,52 @@
       </p:cxnSp>
       <p:cxnSp>
         <p:nvCxnSpPr>
-          <p:cNvPr id="72" name="直接连接符 71">
+          <p:cNvPr id="76" name="连接符: 肘形 75">
             <a:extLst>
               <a:ext uri="{FF2B5EF4-FFF2-40B4-BE49-F238E27FC236}">
-                <a16:creationId xmlns:a16="http://schemas.microsoft.com/office/drawing/2014/main" id="{8E1BCE9D-3EE2-4FB8-8922-22CA03785A25}"/>
+                <a16:creationId xmlns:a16="http://schemas.microsoft.com/office/drawing/2014/main" id="{4A254240-EC12-4F69-A7C9-4BC15F45F210}"/>
+              </a:ext>
+            </a:extLst>
+          </p:cNvPr>
+          <p:cNvCxnSpPr>
+            <a:cxnSpLocks/>
+            <a:stCxn id="57" idx="2"/>
+          </p:cNvCxnSpPr>
+          <p:nvPr/>
+        </p:nvCxnSpPr>
+        <p:spPr>
+          <a:xfrm rot="5400000">
+            <a:off x="7112349" y="2109474"/>
+            <a:ext cx="933193" cy="4194259"/>
+          </a:xfrm>
+          <a:prstGeom prst="bentConnector2">
+            <a:avLst/>
+          </a:prstGeom>
+          <a:ln>
+            <a:tailEnd type="triangle"/>
+          </a:ln>
+        </p:spPr>
+        <p:style>
+          <a:lnRef idx="1">
+            <a:schemeClr val="accent1"/>
+          </a:lnRef>
+          <a:fillRef idx="0">
+            <a:schemeClr val="accent1"/>
+          </a:fillRef>
+          <a:effectRef idx="0">
+            <a:schemeClr val="accent1"/>
+          </a:effectRef>
+          <a:fontRef idx="minor">
+            <a:schemeClr val="tx1"/>
+          </a:fontRef>
+        </p:style>
+      </p:cxnSp>
+      <p:cxnSp>
+        <p:nvCxnSpPr>
+          <p:cNvPr id="79" name="直接箭头连接符 78">
+            <a:extLst>
+              <a:ext uri="{FF2B5EF4-FFF2-40B4-BE49-F238E27FC236}">
+                <a16:creationId xmlns:a16="http://schemas.microsoft.com/office/drawing/2014/main" id="{10C09F85-BD39-4A91-A2E1-E1FF4D84E4FD}"/>
               </a:ext>
             </a:extLst>
           </p:cNvPr>
@@ -4192,31 +4340,352 @@
         </p:nvCxnSpPr>
         <p:spPr>
           <a:xfrm>
-            <a:off x="7232308" y="352408"/>
-            <a:ext cx="41329" cy="4200525"/>
+            <a:off x="9339309" y="3740007"/>
+            <a:ext cx="0" cy="2342139"/>
+          </a:xfrm>
+          <a:prstGeom prst="straightConnector1">
+            <a:avLst/>
+          </a:prstGeom>
+          <a:ln>
+            <a:tailEnd type="triangle"/>
+          </a:ln>
+        </p:spPr>
+        <p:style>
+          <a:lnRef idx="1">
+            <a:schemeClr val="accent1"/>
+          </a:lnRef>
+          <a:fillRef idx="0">
+            <a:schemeClr val="accent1"/>
+          </a:fillRef>
+          <a:effectRef idx="0">
+            <a:schemeClr val="accent1"/>
+          </a:effectRef>
+          <a:fontRef idx="minor">
+            <a:schemeClr val="tx1"/>
+          </a:fontRef>
+        </p:style>
+      </p:cxnSp>
+      <p:cxnSp>
+        <p:nvCxnSpPr>
+          <p:cNvPr id="81" name="直接箭头连接符 80">
+            <a:extLst>
+              <a:ext uri="{FF2B5EF4-FFF2-40B4-BE49-F238E27FC236}">
+                <a16:creationId xmlns:a16="http://schemas.microsoft.com/office/drawing/2014/main" id="{33FBF35D-CC8D-4480-B25C-500C8D52F8FF}"/>
+              </a:ext>
+            </a:extLst>
+          </p:cNvPr>
+          <p:cNvCxnSpPr/>
+          <p:nvPr/>
+        </p:nvCxnSpPr>
+        <p:spPr>
+          <a:xfrm flipV="1">
+            <a:off x="9951868" y="3740007"/>
+            <a:ext cx="0" cy="2342139"/>
+          </a:xfrm>
+          <a:prstGeom prst="straightConnector1">
+            <a:avLst/>
+          </a:prstGeom>
+          <a:ln>
+            <a:tailEnd type="triangle"/>
+          </a:ln>
+        </p:spPr>
+        <p:style>
+          <a:lnRef idx="1">
+            <a:schemeClr val="accent1"/>
+          </a:lnRef>
+          <a:fillRef idx="0">
+            <a:schemeClr val="accent1"/>
+          </a:fillRef>
+          <a:effectRef idx="0">
+            <a:schemeClr val="accent1"/>
+          </a:effectRef>
+          <a:fontRef idx="minor">
+            <a:schemeClr val="tx1"/>
+          </a:fontRef>
+        </p:style>
+      </p:cxnSp>
+      <p:cxnSp>
+        <p:nvCxnSpPr>
+          <p:cNvPr id="85" name="连接符: 肘形 84">
+            <a:extLst>
+              <a:ext uri="{FF2B5EF4-FFF2-40B4-BE49-F238E27FC236}">
+                <a16:creationId xmlns:a16="http://schemas.microsoft.com/office/drawing/2014/main" id="{1657F518-1748-4581-865C-43C15D7BFC8C}"/>
+              </a:ext>
+            </a:extLst>
+          </p:cNvPr>
+          <p:cNvCxnSpPr>
+            <a:stCxn id="43" idx="0"/>
+            <a:endCxn id="67" idx="1"/>
+          </p:cNvCxnSpPr>
+          <p:nvPr/>
+        </p:nvCxnSpPr>
+        <p:spPr>
+          <a:xfrm rot="5400000" flipH="1" flipV="1">
+            <a:off x="3983096" y="1465435"/>
+            <a:ext cx="2343502" cy="653935"/>
+          </a:xfrm>
+          <a:prstGeom prst="bentConnector2">
+            <a:avLst/>
+          </a:prstGeom>
+          <a:ln>
+            <a:tailEnd type="triangle"/>
+          </a:ln>
+        </p:spPr>
+        <p:style>
+          <a:lnRef idx="1">
+            <a:schemeClr val="accent1"/>
+          </a:lnRef>
+          <a:fillRef idx="0">
+            <a:schemeClr val="accent1"/>
+          </a:fillRef>
+          <a:effectRef idx="0">
+            <a:schemeClr val="accent1"/>
+          </a:effectRef>
+          <a:fontRef idx="minor">
+            <a:schemeClr val="tx1"/>
+          </a:fontRef>
+        </p:style>
+      </p:cxnSp>
+      <p:cxnSp>
+        <p:nvCxnSpPr>
+          <p:cNvPr id="87" name="直接连接符 86">
+            <a:extLst>
+              <a:ext uri="{FF2B5EF4-FFF2-40B4-BE49-F238E27FC236}">
+                <a16:creationId xmlns:a16="http://schemas.microsoft.com/office/drawing/2014/main" id="{829F11AC-3127-445E-9833-52149DB49332}"/>
+              </a:ext>
+            </a:extLst>
+          </p:cNvPr>
+          <p:cNvCxnSpPr>
+            <a:stCxn id="67" idx="2"/>
+          </p:cNvCxnSpPr>
+          <p:nvPr/>
+        </p:nvCxnSpPr>
+        <p:spPr>
+          <a:xfrm>
+            <a:off x="6135750" y="1008578"/>
+            <a:ext cx="0" cy="589331"/>
           </a:xfrm>
           <a:prstGeom prst="line">
             <a:avLst/>
           </a:prstGeom>
-          <a:ln w="9525" cap="flat" cmpd="sng" algn="ctr">
-            <a:solidFill>
-              <a:schemeClr val="accent1"/>
-            </a:solidFill>
-            <a:prstDash val="dash"/>
-            <a:round/>
-            <a:headEnd type="none" w="med" len="med"/>
-            <a:tailEnd type="none" w="med" len="med"/>
+        </p:spPr>
+        <p:style>
+          <a:lnRef idx="1">
+            <a:schemeClr val="accent1"/>
+          </a:lnRef>
+          <a:fillRef idx="0">
+            <a:schemeClr val="accent1"/>
+          </a:fillRef>
+          <a:effectRef idx="0">
+            <a:schemeClr val="accent1"/>
+          </a:effectRef>
+          <a:fontRef idx="minor">
+            <a:schemeClr val="tx1"/>
+          </a:fontRef>
+        </p:style>
+      </p:cxnSp>
+      <p:cxnSp>
+        <p:nvCxnSpPr>
+          <p:cNvPr id="89" name="连接符: 肘形 88">
+            <a:extLst>
+              <a:ext uri="{FF2B5EF4-FFF2-40B4-BE49-F238E27FC236}">
+                <a16:creationId xmlns:a16="http://schemas.microsoft.com/office/drawing/2014/main" id="{875AD84C-ADCE-492A-9D91-6BA6EC93B36E}"/>
+              </a:ext>
+            </a:extLst>
+          </p:cNvPr>
+          <p:cNvCxnSpPr>
+            <a:endCxn id="28" idx="0"/>
+          </p:cNvCxnSpPr>
+          <p:nvPr/>
+        </p:nvCxnSpPr>
+        <p:spPr>
+          <a:xfrm rot="10800000" flipV="1">
+            <a:off x="2633818" y="1597909"/>
+            <a:ext cx="3501932" cy="1366244"/>
+          </a:xfrm>
+          <a:prstGeom prst="bentConnector2">
+            <a:avLst/>
+          </a:prstGeom>
+          <a:ln>
+            <a:tailEnd type="triangle"/>
           </a:ln>
         </p:spPr>
         <p:style>
-          <a:lnRef idx="0">
-            <a:scrgbClr r="0" g="0" b="0"/>
+          <a:lnRef idx="1">
+            <a:schemeClr val="accent1"/>
           </a:lnRef>
           <a:fillRef idx="0">
-            <a:scrgbClr r="0" g="0" b="0"/>
+            <a:schemeClr val="accent1"/>
           </a:fillRef>
           <a:effectRef idx="0">
-            <a:scrgbClr r="0" g="0" b="0"/>
+            <a:schemeClr val="accent1"/>
+          </a:effectRef>
+          <a:fontRef idx="minor">
+            <a:schemeClr val="tx1"/>
+          </a:fontRef>
+        </p:style>
+      </p:cxnSp>
+      <p:cxnSp>
+        <p:nvCxnSpPr>
+          <p:cNvPr id="91" name="连接符: 肘形 90">
+            <a:extLst>
+              <a:ext uri="{FF2B5EF4-FFF2-40B4-BE49-F238E27FC236}">
+                <a16:creationId xmlns:a16="http://schemas.microsoft.com/office/drawing/2014/main" id="{AA4DFCBC-B6FD-4E81-95CB-419238A9A03E}"/>
+              </a:ext>
+            </a:extLst>
+          </p:cNvPr>
+          <p:cNvCxnSpPr/>
+          <p:nvPr/>
+        </p:nvCxnSpPr>
+        <p:spPr>
+          <a:xfrm rot="5400000">
+            <a:off x="4959365" y="1793392"/>
+            <a:ext cx="1371868" cy="980903"/>
+          </a:xfrm>
+          <a:prstGeom prst="bentConnector3">
+            <a:avLst>
+              <a:gd name="adj1" fmla="val 172"/>
+            </a:avLst>
+          </a:prstGeom>
+          <a:ln>
+            <a:tailEnd type="triangle"/>
+          </a:ln>
+        </p:spPr>
+        <p:style>
+          <a:lnRef idx="1">
+            <a:schemeClr val="accent1"/>
+          </a:lnRef>
+          <a:fillRef idx="0">
+            <a:schemeClr val="accent1"/>
+          </a:fillRef>
+          <a:effectRef idx="0">
+            <a:schemeClr val="accent1"/>
+          </a:effectRef>
+          <a:fontRef idx="minor">
+            <a:schemeClr val="tx1"/>
+          </a:fontRef>
+        </p:style>
+      </p:cxnSp>
+      <p:cxnSp>
+        <p:nvCxnSpPr>
+          <p:cNvPr id="94" name="连接符: 肘形 93">
+            <a:extLst>
+              <a:ext uri="{FF2B5EF4-FFF2-40B4-BE49-F238E27FC236}">
+                <a16:creationId xmlns:a16="http://schemas.microsoft.com/office/drawing/2014/main" id="{52F3DE61-B806-45EB-8DE3-8011BC24090B}"/>
+              </a:ext>
+            </a:extLst>
+          </p:cNvPr>
+          <p:cNvCxnSpPr>
+            <a:endCxn id="8" idx="0"/>
+          </p:cNvCxnSpPr>
+          <p:nvPr/>
+        </p:nvCxnSpPr>
+        <p:spPr>
+          <a:xfrm rot="16200000" flipH="1">
+            <a:off x="5979096" y="1754563"/>
+            <a:ext cx="1366244" cy="1052936"/>
+          </a:xfrm>
+          <a:prstGeom prst="bentConnector3">
+            <a:avLst>
+              <a:gd name="adj1" fmla="val -683"/>
+            </a:avLst>
+          </a:prstGeom>
+          <a:ln>
+            <a:tailEnd type="triangle"/>
+          </a:ln>
+        </p:spPr>
+        <p:style>
+          <a:lnRef idx="1">
+            <a:schemeClr val="accent1"/>
+          </a:lnRef>
+          <a:fillRef idx="0">
+            <a:schemeClr val="accent1"/>
+          </a:fillRef>
+          <a:effectRef idx="0">
+            <a:schemeClr val="accent1"/>
+          </a:effectRef>
+          <a:fontRef idx="minor">
+            <a:schemeClr val="tx1"/>
+          </a:fontRef>
+        </p:style>
+      </p:cxnSp>
+      <p:cxnSp>
+        <p:nvCxnSpPr>
+          <p:cNvPr id="97" name="连接符: 肘形 96">
+            <a:extLst>
+              <a:ext uri="{FF2B5EF4-FFF2-40B4-BE49-F238E27FC236}">
+                <a16:creationId xmlns:a16="http://schemas.microsoft.com/office/drawing/2014/main" id="{D13EB1C3-7529-4BEC-A49B-C3FDBB6E9DB3}"/>
+              </a:ext>
+            </a:extLst>
+          </p:cNvPr>
+          <p:cNvCxnSpPr>
+            <a:endCxn id="57" idx="0"/>
+          </p:cNvCxnSpPr>
+          <p:nvPr/>
+        </p:nvCxnSpPr>
+        <p:spPr>
+          <a:xfrm>
+            <a:off x="6135749" y="1592285"/>
+            <a:ext cx="3540325" cy="1371868"/>
+          </a:xfrm>
+          <a:prstGeom prst="bentConnector2">
+            <a:avLst/>
+          </a:prstGeom>
+          <a:ln>
+            <a:tailEnd type="triangle"/>
+          </a:ln>
+        </p:spPr>
+        <p:style>
+          <a:lnRef idx="1">
+            <a:schemeClr val="accent1"/>
+          </a:lnRef>
+          <a:fillRef idx="0">
+            <a:schemeClr val="accent1"/>
+          </a:fillRef>
+          <a:effectRef idx="0">
+            <a:schemeClr val="accent1"/>
+          </a:effectRef>
+          <a:fontRef idx="minor">
+            <a:schemeClr val="tx1"/>
+          </a:fontRef>
+        </p:style>
+      </p:cxnSp>
+      <p:cxnSp>
+        <p:nvCxnSpPr>
+          <p:cNvPr id="104" name="连接符: 肘形 103">
+            <a:extLst>
+              <a:ext uri="{FF2B5EF4-FFF2-40B4-BE49-F238E27FC236}">
+                <a16:creationId xmlns:a16="http://schemas.microsoft.com/office/drawing/2014/main" id="{67D91B65-A9F6-451C-8316-0AE7184DEC7A}"/>
+              </a:ext>
+            </a:extLst>
+          </p:cNvPr>
+          <p:cNvCxnSpPr>
+            <a:stCxn id="26" idx="1"/>
+            <a:endCxn id="28" idx="2"/>
+          </p:cNvCxnSpPr>
+          <p:nvPr/>
+        </p:nvCxnSpPr>
+        <p:spPr>
+          <a:xfrm rot="10800000">
+            <a:off x="2633819" y="3740007"/>
+            <a:ext cx="6388321" cy="2730066"/>
+          </a:xfrm>
+          <a:prstGeom prst="bentConnector2">
+            <a:avLst/>
+          </a:prstGeom>
+          <a:ln>
+            <a:tailEnd type="triangle"/>
+          </a:ln>
+        </p:spPr>
+        <p:style>
+          <a:lnRef idx="1">
+            <a:schemeClr val="accent1"/>
+          </a:lnRef>
+          <a:fillRef idx="0">
+            <a:schemeClr val="accent1"/>
+          </a:fillRef>
+          <a:effectRef idx="0">
+            <a:schemeClr val="accent1"/>
           </a:effectRef>
           <a:fontRef idx="minor">
             <a:schemeClr val="tx1"/>

</xml_diff>